<commit_message>
game design unit files
</commit_message>
<xml_diff>
--- a/2nd Semester/MathAnalysis_Day_064 Individual-Group Checkpoint, Continue Project, (Day 14).pptx
+++ b/2nd Semester/MathAnalysis_Day_064 Individual-Group Checkpoint, Continue Project, (Day 14).pptx
@@ -204,7 +204,7 @@
           <a:p>
             <a:fld id="{0090E0ED-51A2-4D0E-BDCF-E17571396CEC}" type="datetimeFigureOut">
               <a:rPr lang="en-US" smtClean="0"/>
-              <a:t>3/28/2018</a:t>
+              <a:t>4/2/2018</a:t>
             </a:fld>
             <a:endParaRPr lang="en-US"/>
           </a:p>
@@ -457,7 +457,7 @@
             <a:fld id="{87DE6118-2437-4B30-8E3C-4D2BE6020583}" type="datetimeFigureOut">
               <a:rPr lang="en-US" dirty="0"/>
               <a:pPr/>
-              <a:t>3/28/2018</a:t>
+              <a:t>4/2/2018</a:t>
             </a:fld>
             <a:endParaRPr lang="en-US" dirty="0"/>
           </a:p>
@@ -783,7 +783,7 @@
           <a:p>
             <a:fld id="{87DE6118-2437-4B30-8E3C-4D2BE6020583}" type="datetimeFigureOut">
               <a:rPr lang="en-US" dirty="0"/>
-              <a:t>3/28/2018</a:t>
+              <a:t>4/2/2018</a:t>
             </a:fld>
             <a:endParaRPr lang="en-US" dirty="0"/>
           </a:p>
@@ -958,7 +958,7 @@
           <a:p>
             <a:fld id="{87DE6118-2437-4B30-8E3C-4D2BE6020583}" type="datetimeFigureOut">
               <a:rPr lang="en-US" dirty="0"/>
-              <a:t>3/28/2018</a:t>
+              <a:t>4/2/2018</a:t>
             </a:fld>
             <a:endParaRPr lang="en-US" dirty="0"/>
           </a:p>
@@ -1123,7 +1123,7 @@
           <a:p>
             <a:fld id="{87DE6118-2437-4B30-8E3C-4D2BE6020583}" type="datetimeFigureOut">
               <a:rPr lang="en-US" dirty="0"/>
-              <a:t>3/28/2018</a:t>
+              <a:t>4/2/2018</a:t>
             </a:fld>
             <a:endParaRPr lang="en-US" dirty="0"/>
           </a:p>
@@ -1396,7 +1396,7 @@
             <a:fld id="{87DE6118-2437-4B30-8E3C-4D2BE6020583}" type="datetimeFigureOut">
               <a:rPr lang="en-US" dirty="0"/>
               <a:pPr/>
-              <a:t>3/28/2018</a:t>
+              <a:t>4/2/2018</a:t>
             </a:fld>
             <a:endParaRPr lang="en-US" dirty="0"/>
           </a:p>
@@ -1786,7 +1786,7 @@
           <a:p>
             <a:fld id="{87DE6118-2437-4B30-8E3C-4D2BE6020583}" type="datetimeFigureOut">
               <a:rPr lang="en-US" dirty="0"/>
-              <a:t>3/28/2018</a:t>
+              <a:t>4/2/2018</a:t>
             </a:fld>
             <a:endParaRPr lang="en-US" dirty="0"/>
           </a:p>
@@ -2258,7 +2258,7 @@
           <a:p>
             <a:fld id="{87DE6118-2437-4B30-8E3C-4D2BE6020583}" type="datetimeFigureOut">
               <a:rPr lang="en-US" dirty="0"/>
-              <a:t>3/28/2018</a:t>
+              <a:t>4/2/2018</a:t>
             </a:fld>
             <a:endParaRPr lang="en-US" dirty="0"/>
           </a:p>
@@ -2371,7 +2371,7 @@
           <a:p>
             <a:fld id="{87DE6118-2437-4B30-8E3C-4D2BE6020583}" type="datetimeFigureOut">
               <a:rPr lang="en-US" dirty="0"/>
-              <a:t>3/28/2018</a:t>
+              <a:t>4/2/2018</a:t>
             </a:fld>
             <a:endParaRPr lang="en-US" dirty="0"/>
           </a:p>
@@ -2461,7 +2461,7 @@
           <a:p>
             <a:fld id="{87DE6118-2437-4B30-8E3C-4D2BE6020583}" type="datetimeFigureOut">
               <a:rPr lang="en-US" dirty="0"/>
-              <a:t>3/28/2018</a:t>
+              <a:t>4/2/2018</a:t>
             </a:fld>
             <a:endParaRPr lang="en-US" dirty="0"/>
           </a:p>
@@ -2803,7 +2803,7 @@
             <a:fld id="{87DE6118-2437-4B30-8E3C-4D2BE6020583}" type="datetimeFigureOut">
               <a:rPr lang="en-US" dirty="0"/>
               <a:pPr/>
-              <a:t>3/28/2018</a:t>
+              <a:t>4/2/2018</a:t>
             </a:fld>
             <a:endParaRPr lang="en-US" dirty="0"/>
           </a:p>
@@ -3188,7 +3188,7 @@
             <a:fld id="{87DE6118-2437-4B30-8E3C-4D2BE6020583}" type="datetimeFigureOut">
               <a:rPr lang="en-US" dirty="0"/>
               <a:pPr/>
-              <a:t>3/28/2018</a:t>
+              <a:t>4/2/2018</a:t>
             </a:fld>
             <a:endParaRPr lang="en-US" dirty="0"/>
           </a:p>
@@ -3463,7 +3463,7 @@
             <a:fld id="{87DE6118-2437-4B30-8E3C-4D2BE6020583}" type="datetimeFigureOut">
               <a:rPr lang="en-US" dirty="0"/>
               <a:pPr/>
-              <a:t>3/28/2018</a:t>
+              <a:t>4/2/2018</a:t>
             </a:fld>
             <a:endParaRPr lang="en-US" dirty="0"/>
           </a:p>
@@ -4010,12 +4010,12 @@
           <a:lstStyle/>
           <a:p>
             <a:r>
-              <a:rPr lang="en-US" dirty="0" smtClean="0"/>
+              <a:rPr lang="en-US" smtClean="0"/>
               <a:t>Day </a:t>
             </a:r>
             <a:r>
-              <a:rPr lang="en-US" dirty="0" smtClean="0"/>
-              <a:t>63</a:t>
+              <a:rPr lang="en-US" smtClean="0"/>
+              <a:t>64</a:t>
             </a:r>
             <a:endParaRPr lang="en-US" dirty="0"/>
           </a:p>
@@ -4421,11 +4421,7 @@
             </a:br>
             <a:r>
               <a:rPr lang="en-US" dirty="0" smtClean="0"/>
-              <a:t>4 weeks </a:t>
-            </a:r>
-            <a:r>
-              <a:rPr lang="en-US" dirty="0" smtClean="0"/>
-              <a:t>to finish projects</a:t>
+              <a:t>4 weeks to finish projects</a:t>
             </a:r>
             <a:endParaRPr lang="en-US" dirty="0"/>
           </a:p>
@@ -4469,15 +4465,7 @@
             </a:pPr>
             <a:r>
               <a:rPr lang="en-US" sz="3400" dirty="0" smtClean="0"/>
-              <a:t>Essentially </a:t>
-            </a:r>
-            <a:r>
-              <a:rPr lang="en-US" sz="3400" dirty="0" smtClean="0"/>
-              <a:t>10 </a:t>
-            </a:r>
-            <a:r>
-              <a:rPr lang="en-US" sz="3400" dirty="0" smtClean="0"/>
-              <a:t>class periods left to complete </a:t>
+              <a:t>Essentially 10 class periods left to complete </a:t>
             </a:r>
           </a:p>
           <a:p>
@@ -4497,8 +4485,13 @@
             </a:pPr>
             <a:r>
               <a:rPr lang="en-US" sz="3400" dirty="0" smtClean="0"/>
-              <a:t>One on One with Mr. Cuddy about individual plan</a:t>
-            </a:r>
+              <a:t>One on One with Mr. Cuddy about </a:t>
+            </a:r>
+            <a:r>
+              <a:rPr lang="en-US" sz="3400" smtClean="0"/>
+              <a:t>individual plan next time</a:t>
+            </a:r>
+            <a:endParaRPr lang="en-US" sz="3400" dirty="0" smtClean="0"/>
           </a:p>
         </p:txBody>
       </p:sp>
@@ -4594,30 +4587,18 @@
           <a:p>
             <a:r>
               <a:rPr lang="en-US" sz="3400" b="1" dirty="0" smtClean="0"/>
-              <a:t>Week 6: </a:t>
-            </a:r>
+              <a:t>Week 6: [FINISH] </a:t>
+            </a:r>
+            <a:r>
+              <a:rPr lang="en-US" sz="3400" dirty="0" smtClean="0"/>
+              <a:t>Revise vision if needed, continue to code</a:t>
+            </a:r>
+            <a:endParaRPr lang="en-US" sz="3400" u="sng" dirty="0" smtClean="0"/>
+          </a:p>
+          <a:p>
             <a:r>
               <a:rPr lang="en-US" sz="3400" b="1" dirty="0" smtClean="0"/>
-              <a:t>[FINISH] </a:t>
-            </a:r>
-            <a:r>
-              <a:rPr lang="en-US" sz="3400" dirty="0" smtClean="0"/>
-              <a:t>Revise </a:t>
-            </a:r>
-            <a:r>
-              <a:rPr lang="en-US" sz="3400" dirty="0" smtClean="0"/>
-              <a:t>vision if needed, continue to code</a:t>
-            </a:r>
-            <a:endParaRPr lang="en-US" sz="3400" u="sng" dirty="0" smtClean="0"/>
-          </a:p>
-          <a:p>
-            <a:r>
-              <a:rPr lang="en-US" sz="3400" b="1" dirty="0" smtClean="0"/>
-              <a:t>Week 7</a:t>
-            </a:r>
-            <a:r>
-              <a:rPr lang="en-US" sz="3400" b="1" dirty="0" smtClean="0"/>
-              <a:t>: [NEXT WEEK] </a:t>
+              <a:t>Week 7: [NEXT WEEK] </a:t>
             </a:r>
             <a:r>
               <a:rPr lang="en-US" sz="3400" dirty="0"/>

</xml_diff>